<commit_message>
Aggiunto preprocessing nostri POI
</commit_message>
<xml_diff>
--- a/RASTA/SENTIMENT ANALYSIS delle recensioni.pptx
+++ b/RASTA/SENTIMENT ANALYSIS delle recensioni.pptx
@@ -1496,7 +1496,7 @@
             <a:pPr rtl="0"/>
             <a:fld id="{217E958C-0E73-494C-9AE8-3A2653B3A99C}" type="datetime1">
               <a:rPr lang="it-IT" smtClean="0"/>
-              <a:t>22/05/2024</a:t>
+              <a:t>23/05/2024</a:t>
             </a:fld>
             <a:endParaRPr lang="it-IT" dirty="0"/>
           </a:p>
@@ -1678,7 +1678,7 @@
             <a:fld id="{96B87097-53AC-4366-9417-6AC7F2B331A2}" type="datetime1">
               <a:rPr lang="it-IT" smtClean="0"/>
               <a:pPr/>
-              <a:t>22/05/2024</a:t>
+              <a:t>23/05/2024</a:t>
             </a:fld>
             <a:endParaRPr lang="it-IT" dirty="0"/>
           </a:p>
@@ -29285,7 +29285,11 @@
             </a:pPr>
             <a:r>
               <a:rPr lang="it-IT" b="1" dirty="0"/>
-              <a:t>Dati di Addestramento</a:t>
+              <a:t>Dati </a:t>
+            </a:r>
+            <a:r>
+              <a:rPr lang="it-IT" b="1"/>
+              <a:t>di addestramento</a:t>
             </a:r>
             <a:r>
               <a:rPr lang="it-IT" dirty="0"/>
@@ -29394,7 +29398,7 @@
             </a:pPr>
             <a:r>
               <a:rPr lang="it-IT" b="1" dirty="0"/>
-              <a:t>Dataset</a:t>
+              <a:t>Dati di addestramento</a:t>
             </a:r>
             <a:r>
               <a:rPr lang="it-IT" dirty="0"/>
@@ -47796,12 +47800,23 @@
 </file>
 
 <file path=customXml/item1.xml><?xml version="1.0" encoding="utf-8"?>
-<?mso-contentType ?>
-<FormTemplates xmlns="http://schemas.microsoft.com/sharepoint/v3/contenttype/forms">
-  <Display>DocumentLibraryForm</Display>
-  <Edit>DocumentLibraryForm</Edit>
-  <New>DocumentLibraryForm</New>
-</FormTemplates>
+<p:properties xmlns:p="http://schemas.microsoft.com/office/2006/metadata/properties" xmlns:xsi="http://www.w3.org/2001/XMLSchema-instance" xmlns:pc="http://schemas.microsoft.com/office/infopath/2007/PartnerControls">
+  <documentManagement>
+    <_ip_UnifiedCompliancePolicyUIAction xmlns="http://schemas.microsoft.com/sharepoint/v3" xsi:nil="true"/>
+    <Image xmlns="71af3243-3dd4-4a8d-8c0d-dd76da1f02a5">
+      <Url xsi:nil="true"/>
+      <Description xsi:nil="true"/>
+    </Image>
+    <Status xmlns="71af3243-3dd4-4a8d-8c0d-dd76da1f02a5">Not started</Status>
+    <Background xmlns="71af3243-3dd4-4a8d-8c0d-dd76da1f02a5">false</Background>
+    <_ip_UnifiedCompliancePolicyProperties xmlns="http://schemas.microsoft.com/sharepoint/v3" xsi:nil="true"/>
+    <ImageTagsTaxHTField xmlns="71af3243-3dd4-4a8d-8c0d-dd76da1f02a5">
+      <Terms xmlns="http://schemas.microsoft.com/office/infopath/2007/PartnerControls"/>
+    </ImageTagsTaxHTField>
+    <TaxCatchAll xmlns="230e9df3-be65-4c73-a93b-d1236ebd677e" xsi:nil="true"/>
+    <MediaServiceKeyPoints xmlns="71af3243-3dd4-4a8d-8c0d-dd76da1f02a5" xsi:nil="true"/>
+  </documentManagement>
+</p:properties>
 </file>
 
 <file path=customXml/item2.xml><?xml version="1.0" encoding="utf-8"?>
@@ -48099,29 +48114,29 @@
 </file>
 
 <file path=customXml/item3.xml><?xml version="1.0" encoding="utf-8"?>
-<p:properties xmlns:p="http://schemas.microsoft.com/office/2006/metadata/properties" xmlns:xsi="http://www.w3.org/2001/XMLSchema-instance" xmlns:pc="http://schemas.microsoft.com/office/infopath/2007/PartnerControls">
-  <documentManagement>
-    <_ip_UnifiedCompliancePolicyUIAction xmlns="http://schemas.microsoft.com/sharepoint/v3" xsi:nil="true"/>
-    <Image xmlns="71af3243-3dd4-4a8d-8c0d-dd76da1f02a5">
-      <Url xsi:nil="true"/>
-      <Description xsi:nil="true"/>
-    </Image>
-    <Status xmlns="71af3243-3dd4-4a8d-8c0d-dd76da1f02a5">Not started</Status>
-    <Background xmlns="71af3243-3dd4-4a8d-8c0d-dd76da1f02a5">false</Background>
-    <_ip_UnifiedCompliancePolicyProperties xmlns="http://schemas.microsoft.com/sharepoint/v3" xsi:nil="true"/>
-    <ImageTagsTaxHTField xmlns="71af3243-3dd4-4a8d-8c0d-dd76da1f02a5">
-      <Terms xmlns="http://schemas.microsoft.com/office/infopath/2007/PartnerControls"/>
-    </ImageTagsTaxHTField>
-    <TaxCatchAll xmlns="230e9df3-be65-4c73-a93b-d1236ebd677e" xsi:nil="true"/>
-    <MediaServiceKeyPoints xmlns="71af3243-3dd4-4a8d-8c0d-dd76da1f02a5" xsi:nil="true"/>
-  </documentManagement>
-</p:properties>
+<?mso-contentType ?>
+<FormTemplates xmlns="http://schemas.microsoft.com/sharepoint/v3/contenttype/forms">
+  <Display>DocumentLibraryForm</Display>
+  <Edit>DocumentLibraryForm</Edit>
+  <New>DocumentLibraryForm</New>
+</FormTemplates>
 </file>
 
 <file path=customXml/itemProps1.xml><?xml version="1.0" encoding="utf-8"?>
-<ds:datastoreItem xmlns:ds="http://schemas.openxmlformats.org/officeDocument/2006/customXml" ds:itemID="{CBB8FCA9-2C7D-45A4-87C8-02C272E9F4DD}">
+<ds:datastoreItem xmlns:ds="http://schemas.openxmlformats.org/officeDocument/2006/customXml" ds:itemID="{339B373E-6FDE-4773-A0C6-CDA9846E30C9}">
   <ds:schemaRefs>
-    <ds:schemaRef ds:uri="http://schemas.microsoft.com/sharepoint/v3/contenttype/forms"/>
+    <ds:schemaRef ds:uri="http://purl.org/dc/terms/"/>
+    <ds:schemaRef ds:uri="http://schemas.microsoft.com/office/2006/metadata/properties"/>
+    <ds:schemaRef ds:uri="http://schemas.openxmlformats.org/package/2006/metadata/core-properties"/>
+    <ds:schemaRef ds:uri="http://purl.org/dc/dcmitype/"/>
+    <ds:schemaRef ds:uri="http://www.w3.org/XML/1998/namespace"/>
+    <ds:schemaRef ds:uri="16c05727-aa75-4e4a-9b5f-8a80a1165891"/>
+    <ds:schemaRef ds:uri="230e9df3-be65-4c73-a93b-d1236ebd677e"/>
+    <ds:schemaRef ds:uri="http://schemas.microsoft.com/office/infopath/2007/PartnerControls"/>
+    <ds:schemaRef ds:uri="http://schemas.microsoft.com/office/2006/documentManagement/types"/>
+    <ds:schemaRef ds:uri="http://schemas.microsoft.com/sharepoint/v3"/>
+    <ds:schemaRef ds:uri="71af3243-3dd4-4a8d-8c0d-dd76da1f02a5"/>
+    <ds:schemaRef ds:uri="http://purl.org/dc/elements/1.1/"/>
   </ds:schemaRefs>
 </ds:datastoreItem>
 </file>
@@ -48148,20 +48163,9 @@
 </file>
 
 <file path=customXml/itemProps3.xml><?xml version="1.0" encoding="utf-8"?>
-<ds:datastoreItem xmlns:ds="http://schemas.openxmlformats.org/officeDocument/2006/customXml" ds:itemID="{339B373E-6FDE-4773-A0C6-CDA9846E30C9}">
+<ds:datastoreItem xmlns:ds="http://schemas.openxmlformats.org/officeDocument/2006/customXml" ds:itemID="{CBB8FCA9-2C7D-45A4-87C8-02C272E9F4DD}">
   <ds:schemaRefs>
-    <ds:schemaRef ds:uri="http://purl.org/dc/terms/"/>
-    <ds:schemaRef ds:uri="http://schemas.microsoft.com/office/2006/metadata/properties"/>
-    <ds:schemaRef ds:uri="http://schemas.openxmlformats.org/package/2006/metadata/core-properties"/>
-    <ds:schemaRef ds:uri="http://purl.org/dc/dcmitype/"/>
-    <ds:schemaRef ds:uri="http://www.w3.org/XML/1998/namespace"/>
-    <ds:schemaRef ds:uri="16c05727-aa75-4e4a-9b5f-8a80a1165891"/>
-    <ds:schemaRef ds:uri="230e9df3-be65-4c73-a93b-d1236ebd677e"/>
-    <ds:schemaRef ds:uri="http://schemas.microsoft.com/office/infopath/2007/PartnerControls"/>
-    <ds:schemaRef ds:uri="http://schemas.microsoft.com/office/2006/documentManagement/types"/>
-    <ds:schemaRef ds:uri="http://schemas.microsoft.com/sharepoint/v3"/>
-    <ds:schemaRef ds:uri="71af3243-3dd4-4a8d-8c0d-dd76da1f02a5"/>
-    <ds:schemaRef ds:uri="http://purl.org/dc/elements/1.1/"/>
+    <ds:schemaRef ds:uri="http://schemas.microsoft.com/sharepoint/v3/contenttype/forms"/>
   </ds:schemaRefs>
 </ds:datastoreItem>
 </file>

</xml_diff>